<commit_message>
Main_page Desktop and Mobile 틀 완성
틀은 완성했으니 기능 구현하면 됨
</commit_message>
<xml_diff>
--- a/제안서/개인프로젝트_Dokky_김규정.pptx
+++ b/제안서/개인프로젝트_Dokky_김규정.pptx
@@ -2,7 +2,7 @@
 <file path=ppt/presentation.xml><?xml version="1.0" encoding="utf-8"?>
 <p:presentation xmlns:a="http://schemas.openxmlformats.org/drawingml/2006/main" xmlns:r="http://schemas.openxmlformats.org/officeDocument/2006/relationships" xmlns:p="http://schemas.openxmlformats.org/presentationml/2006/main" xmlns:p14="http://schemas.microsoft.com/office/powerpoint/2010/main" saveSubsetFonts="1">
   <p:sldMasterIdLst>
-    <p:sldMasterId id="2147484992" r:id="rId7"/>
+    <p:sldMasterId id="2147484998" r:id="rId7"/>
   </p:sldMasterIdLst>
   <p:notesMasterIdLst>
     <p:notesMasterId r:id="rId9"/>
@@ -6731,7 +6731,7 @@
                     <a:bodyPr/>
                     <a:lstStyle/>
                     <a:p>
-                      <a:pPr marL="0" indent="0" algn="ctr" fontAlgn="auto" defTabSz="508000">
+                      <a:pPr marL="0" indent="0" algn="ctr" fontAlgn="auto" defTabSz="508000" eaLnBrk="0">
                         <a:lnSpc>
                           <a:spcPct val="100000"/>
                         </a:lnSpc>
@@ -6777,7 +6777,7 @@
                     <a:bodyPr/>
                     <a:lstStyle/>
                     <a:p>
-                      <a:pPr marL="0" indent="0" algn="just" fontAlgn="auto" defTabSz="508000">
+                      <a:pPr marL="0" indent="0" algn="just" fontAlgn="auto" defTabSz="508000" eaLnBrk="0">
                         <a:lnSpc>
                           <a:spcPct val="100000"/>
                         </a:lnSpc>
@@ -6809,7 +6809,7 @@
                       </a:endParaRPr>
                     </a:p>
                     <a:p>
-                      <a:pPr marL="0" indent="0" algn="just" fontAlgn="auto" defTabSz="508000">
+                      <a:pPr marL="0" indent="0" algn="just" fontAlgn="auto" defTabSz="508000" eaLnBrk="0">
                         <a:lnSpc>
                           <a:spcPct val="100000"/>
                         </a:lnSpc>
@@ -6857,7 +6857,7 @@
                     <a:bodyPr/>
                     <a:lstStyle/>
                     <a:p>
-                      <a:pPr marL="0" indent="0" algn="ctr" fontAlgn="auto" defTabSz="508000">
+                      <a:pPr marL="0" indent="0" algn="ctr" fontAlgn="auto" defTabSz="508000" eaLnBrk="0">
                         <a:lnSpc>
                           <a:spcPct val="100000"/>
                         </a:lnSpc>
@@ -6903,7 +6903,7 @@
                     <a:bodyPr/>
                     <a:lstStyle/>
                     <a:p>
-                      <a:pPr marL="0" indent="0" algn="just" fontAlgn="auto" defTabSz="508000">
+                      <a:pPr marL="0" indent="0" algn="just" fontAlgn="auto" defTabSz="508000" eaLnBrk="0">
                         <a:lnSpc>
                           <a:spcPct val="100000"/>
                         </a:lnSpc>
@@ -6951,7 +6951,7 @@
                     <a:bodyPr/>
                     <a:lstStyle/>
                     <a:p>
-                      <a:pPr marL="0" indent="0" algn="ctr" fontAlgn="auto" defTabSz="508000">
+                      <a:pPr marL="0" indent="0" algn="ctr" fontAlgn="auto" defTabSz="508000" eaLnBrk="0">
                         <a:lnSpc>
                           <a:spcPct val="100000"/>
                         </a:lnSpc>
@@ -6997,39 +6997,7 @@
                     <a:bodyPr/>
                     <a:lstStyle/>
                     <a:p>
-                      <a:pPr marL="0" indent="0" algn="just" fontAlgn="auto" defTabSz="508000">
-                        <a:lnSpc>
-                          <a:spcPct val="100000"/>
-                        </a:lnSpc>
-                        <a:spcBef>
-                          <a:spcPts val="0"/>
-                        </a:spcBef>
-                        <a:spcAft>
-                          <a:spcPts val="0"/>
-                        </a:spcAft>
-                        <a:buFontTx/>
-                        <a:buNone/>
-                      </a:pPr>
-                      <a:r>
-                        <a:rPr lang="en-US" altLang="ko-KR" sz="1800" kern="1200" cap="none" dirty="0" smtClean="0" b="1" strike="noStrike">
-                          <a:solidFill>
-                            <a:schemeClr val="tx1"/>
-                          </a:solidFill>
-                          <a:latin typeface="맑은 고딕" charset="0"/>
-                          <a:ea typeface="맑은 고딕" charset="0"/>
-                        </a:rPr>
-                        <a:t>JSP, </a:t>
-                      </a:r>
-                      <a:endParaRPr lang="ko-KR" altLang="en-US" sz="1800" kern="1200" dirty="0" smtClean="0" cap="none" b="1" strike="noStrike">
-                        <a:solidFill>
-                          <a:schemeClr val="tx1"/>
-                        </a:solidFill>
-                        <a:latin typeface="맑은 고딕" charset="0"/>
-                        <a:ea typeface="맑은 고딕" charset="0"/>
-                      </a:endParaRPr>
-                    </a:p>
-                    <a:p>
-                      <a:pPr marL="0" indent="0" algn="just" fontAlgn="auto" defTabSz="508000">
+                      <a:pPr marL="0" indent="0" algn="just" fontAlgn="auto" defTabSz="508000" eaLnBrk="0">
                         <a:lnSpc>
                           <a:spcPct val="100000"/>
                         </a:lnSpc>
@@ -7061,7 +7029,7 @@
                       </a:endParaRPr>
                     </a:p>
                     <a:p>
-                      <a:pPr marL="0" indent="0" algn="just" fontAlgn="auto" defTabSz="508000">
+                      <a:pPr marL="0" indent="0" algn="just" fontAlgn="auto" defTabSz="508000" eaLnBrk="0">
                         <a:lnSpc>
                           <a:spcPct val="100000"/>
                         </a:lnSpc>
@@ -7082,7 +7050,39 @@
                           <a:latin typeface="맑은 고딕" charset="0"/>
                           <a:ea typeface="맑은 고딕" charset="0"/>
                         </a:rPr>
-                        <a:t>JQuery(1.11.1), Ajax</a:t>
+                        <a:t>JQuery(1.11.1), </a:t>
+                      </a:r>
+                      <a:endParaRPr lang="ko-KR" altLang="en-US" sz="1800" kern="1200" dirty="0" smtClean="0" cap="none" b="1" strike="noStrike">
+                        <a:solidFill>
+                          <a:schemeClr val="tx1"/>
+                        </a:solidFill>
+                        <a:latin typeface="맑은 고딕" charset="0"/>
+                        <a:ea typeface="맑은 고딕" charset="0"/>
+                      </a:endParaRPr>
+                    </a:p>
+                    <a:p>
+                      <a:pPr marL="0" indent="0" algn="just" fontAlgn="auto" defTabSz="508000" eaLnBrk="0">
+                        <a:lnSpc>
+                          <a:spcPct val="100000"/>
+                        </a:lnSpc>
+                        <a:spcBef>
+                          <a:spcPts val="0"/>
+                        </a:spcBef>
+                        <a:spcAft>
+                          <a:spcPts val="0"/>
+                        </a:spcAft>
+                        <a:buFontTx/>
+                        <a:buNone/>
+                      </a:pPr>
+                      <a:r>
+                        <a:rPr lang="en-US" altLang="ko-KR" sz="1800" kern="1200" cap="none" dirty="0" smtClean="0" b="1" strike="noStrike">
+                          <a:solidFill>
+                            <a:schemeClr val="tx1"/>
+                          </a:solidFill>
+                          <a:latin typeface="맑은 고딕" charset="0"/>
+                          <a:ea typeface="맑은 고딕" charset="0"/>
+                        </a:rPr>
+                        <a:t>Ajax</a:t>
                       </a:r>
                       <a:endParaRPr lang="ko-KR" altLang="en-US" sz="1800" kern="1200" dirty="0" smtClean="0" cap="none" b="1" strike="noStrike">
                         <a:solidFill>
@@ -7109,7 +7109,7 @@
                     <a:bodyPr/>
                     <a:lstStyle/>
                     <a:p>
-                      <a:pPr marL="0" indent="0" algn="ctr" fontAlgn="auto" defTabSz="508000">
+                      <a:pPr marL="0" indent="0" algn="ctr" fontAlgn="auto" defTabSz="508000" eaLnBrk="0">
                         <a:lnSpc>
                           <a:spcPct val="100000"/>
                         </a:lnSpc>
@@ -7155,7 +7155,7 @@
                     <a:bodyPr/>
                     <a:lstStyle/>
                     <a:p>
-                      <a:pPr marL="0" indent="0" algn="just" fontAlgn="auto" defTabSz="508000">
+                      <a:pPr marL="0" indent="0" algn="just" fontAlgn="auto" defTabSz="508000" eaLnBrk="0">
                         <a:lnSpc>
                           <a:spcPct val="100000"/>
                         </a:lnSpc>
@@ -7203,7 +7203,7 @@
                     <a:bodyPr/>
                     <a:lstStyle/>
                     <a:p>
-                      <a:pPr marL="0" indent="0" algn="ctr" fontAlgn="auto" defTabSz="508000">
+                      <a:pPr marL="0" indent="0" algn="ctr" fontAlgn="auto" defTabSz="508000" eaLnBrk="0">
                         <a:lnSpc>
                           <a:spcPct val="100000"/>
                         </a:lnSpc>
@@ -7249,7 +7249,7 @@
                     <a:bodyPr/>
                     <a:lstStyle/>
                     <a:p>
-                      <a:pPr marL="0" indent="0" algn="just" fontAlgn="auto" defTabSz="508000">
+                      <a:pPr marL="0" indent="0" algn="just" fontAlgn="auto" defTabSz="508000" eaLnBrk="0">
                         <a:lnSpc>
                           <a:spcPct val="100000"/>
                         </a:lnSpc>
@@ -7281,7 +7281,7 @@
                       </a:endParaRPr>
                     </a:p>
                     <a:p>
-                      <a:pPr marL="0" indent="0" algn="just" fontAlgn="auto" defTabSz="508000">
+                      <a:pPr marL="0" indent="0" algn="just" fontAlgn="auto" defTabSz="508000" eaLnBrk="0">
                         <a:lnSpc>
                           <a:spcPct val="100000"/>
                         </a:lnSpc>
@@ -7313,7 +7313,7 @@
                       </a:endParaRPr>
                     </a:p>
                     <a:p>
-                      <a:pPr marL="0" indent="0" algn="just" fontAlgn="auto" defTabSz="508000">
+                      <a:pPr marL="0" indent="0" algn="just" fontAlgn="auto" defTabSz="508000" eaLnBrk="0">
                         <a:lnSpc>
                           <a:spcPct val="100000"/>
                         </a:lnSpc>
@@ -7345,7 +7345,7 @@
                       </a:endParaRPr>
                     </a:p>
                     <a:p>
-                      <a:pPr marL="0" indent="0" algn="just" fontAlgn="auto" defTabSz="508000">
+                      <a:pPr marL="0" indent="0" algn="just" fontAlgn="auto" defTabSz="508000" eaLnBrk="0">
                         <a:lnSpc>
                           <a:spcPct val="100000"/>
                         </a:lnSpc>
@@ -10540,15 +10540,15 @@
           <p:nvPr/>
         </p:nvSpPr>
         <p:spPr>
-          <a:xfrm rot="0">
+          <a:xfrm>
             <a:off x="866775" y="1513840"/>
-            <a:ext cx="9514840" cy="399415"/>
+            <a:ext cx="9515475" cy="706755"/>
           </a:xfrm>
           <a:prstGeom prst="rect"/>
           <a:noFill/>
         </p:spPr>
         <p:txBody>
-          <a:bodyPr wrap="square" lIns="91440" tIns="45720" rIns="91440" bIns="45720" vert="horz" anchor="t">
+          <a:bodyPr wrap="square" lIns="91440" tIns="45720" rIns="91440" bIns="45720" numCol="1" vert="horz" anchor="t">
             <a:spAutoFit/>
           </a:bodyPr>
           <a:lstStyle/>
@@ -10572,6 +10572,32 @@
                 <a:ea typeface="-윤고딕320" charset="0"/>
               </a:rPr>
               <a:t>3. 일정</a:t>
+            </a:r>
+            <a:endParaRPr lang="ko-KR" altLang="en-US" sz="2000" cap="none" dirty="0" smtClean="0" b="0" strike="noStrike">
+              <a:latin typeface="-윤고딕320" charset="0"/>
+              <a:ea typeface="-윤고딕320" charset="0"/>
+            </a:endParaRPr>
+          </a:p>
+          <a:p>
+            <a:pPr marL="0" indent="0" algn="l" fontAlgn="auto" defTabSz="914400" eaLnBrk="0">
+              <a:lnSpc>
+                <a:spcPct val="100000"/>
+              </a:lnSpc>
+              <a:spcBef>
+                <a:spcPts val="0"/>
+              </a:spcBef>
+              <a:spcAft>
+                <a:spcPts val="0"/>
+              </a:spcAft>
+              <a:buFontTx/>
+              <a:buNone/>
+            </a:pPr>
+            <a:r>
+              <a:rPr lang="en-US" altLang="ko-KR" sz="2000" cap="none" dirty="0" smtClean="0" b="0" strike="noStrike">
+                <a:latin typeface="-윤고딕320" charset="0"/>
+                <a:ea typeface="-윤고딕320" charset="0"/>
+              </a:rPr>
+              <a:t> 2019.02.08-02.28</a:t>
             </a:r>
             <a:endParaRPr lang="ko-KR" altLang="en-US" sz="2000" cap="none" dirty="0" smtClean="0" b="0" strike="noStrike">
               <a:latin typeface="-윤고딕320" charset="0"/>
@@ -12435,7 +12461,7 @@
         <p:spPr>
           <a:xfrm rot="0">
             <a:off x="8787765" y="1954530"/>
-            <a:ext cx="2880995" cy="190500"/>
+            <a:ext cx="2565400" cy="217805"/>
           </a:xfrm>
           <a:prstGeom prst="rightArrow">
             <a:avLst>
@@ -12461,12 +12487,12 @@
           </a:fontRef>
         </p:style>
         <p:txBody>
-          <a:bodyPr wrap="square" lIns="91440" tIns="45720" rIns="91440" bIns="45720" vert="horz" anchor="ctr">
+          <a:bodyPr wrap="square" lIns="91440" tIns="45720" rIns="91440" bIns="45720" numCol="1" vert="horz" anchor="ctr">
             <a:noAutofit/>
           </a:bodyPr>
           <a:lstStyle/>
           <a:p>
-            <a:pPr marL="0" indent="0" algn="ctr" fontAlgn="auto" defTabSz="508000">
+            <a:pPr marL="0" indent="0" algn="ctr" fontAlgn="auto" defTabSz="508000" eaLnBrk="0">
               <a:lnSpc>
                 <a:spcPct val="100000"/>
               </a:lnSpc>

</xml_diff>